<commit_message>
add content to presentation
</commit_message>
<xml_diff>
--- a/AJAX Advanced.pptx
+++ b/AJAX Advanced.pptx
@@ -11,11 +11,11 @@
     <p:sldId id="259" r:id="rId5"/>
     <p:sldId id="260" r:id="rId6"/>
     <p:sldId id="266" r:id="rId7"/>
-    <p:sldId id="261" r:id="rId8"/>
-    <p:sldId id="262" r:id="rId9"/>
-    <p:sldId id="263" r:id="rId10"/>
-    <p:sldId id="264" r:id="rId11"/>
-    <p:sldId id="268" r:id="rId12"/>
+    <p:sldId id="264" r:id="rId8"/>
+    <p:sldId id="261" r:id="rId9"/>
+    <p:sldId id="268" r:id="rId10"/>
+    <p:sldId id="262" r:id="rId11"/>
+    <p:sldId id="263" r:id="rId12"/>
     <p:sldId id="267" r:id="rId13"/>
     <p:sldId id="269" r:id="rId14"/>
     <p:sldId id="270" r:id="rId15"/>
@@ -3058,7 +3058,7 @@
           <a:p>
             <a:r>
               <a:rPr lang="en-US" dirty="0"/>
-              <a:t>Polling-</a:t>
+              <a:t>Single Page Applications</a:t>
             </a:r>
           </a:p>
         </p:txBody>
@@ -3080,27 +3080,27 @@
           <a:p>
             <a:r>
               <a:rPr lang="en-US" dirty="0"/>
-              <a:t>Short term polling</a:t>
-            </a:r>
-          </a:p>
-          <a:p>
-            <a:r>
-              <a:rPr lang="en-US" dirty="0"/>
-              <a:t>Long term polling</a:t>
-            </a:r>
-          </a:p>
-          <a:p>
-            <a:r>
-              <a:rPr lang="en-US" dirty="0"/>
-              <a:t>Short term waited polling</a:t>
-            </a:r>
+              <a:t>Problem Of Refresh</a:t>
+            </a:r>
+          </a:p>
+          <a:p>
+            <a:r>
+              <a:rPr lang="en-US" dirty="0"/>
+              <a:t>Routing</a:t>
+            </a:r>
+          </a:p>
+          <a:p>
+            <a:pPr marL="0" indent="0">
+              <a:buNone/>
+            </a:pPr>
+            <a:endParaRPr lang="en-US" dirty="0"/>
           </a:p>
         </p:txBody>
       </p:sp>
     </p:spTree>
     <p:extLst>
       <p:ext uri="{BB962C8B-B14F-4D97-AF65-F5344CB8AC3E}">
-        <p14:creationId xmlns:p14="http://schemas.microsoft.com/office/powerpoint/2010/main" val="789491170"/>
+        <p14:creationId xmlns:p14="http://schemas.microsoft.com/office/powerpoint/2010/main" val="4229231221"/>
       </p:ext>
     </p:extLst>
   </p:cSld>
@@ -3144,7 +3144,7 @@
           <a:p>
             <a:r>
               <a:rPr lang="en-US" dirty="0"/>
-              <a:t>Caching</a:t>
+              <a:t>CORS-</a:t>
             </a:r>
           </a:p>
         </p:txBody>
@@ -3164,14 +3164,23 @@
           <a:bodyPr/>
           <a:lstStyle/>
           <a:p>
-            <a:endParaRPr lang="en-US"/>
+            <a:r>
+              <a:rPr lang="en-US" dirty="0"/>
+              <a:t>Cross Origin Resource Sharing</a:t>
+            </a:r>
+          </a:p>
+          <a:p>
+            <a:r>
+              <a:rPr lang="en-US" dirty="0"/>
+              <a:t>Origin : protocol  Uri  port-no</a:t>
+            </a:r>
           </a:p>
         </p:txBody>
       </p:sp>
     </p:spTree>
     <p:extLst>
       <p:ext uri="{BB962C8B-B14F-4D97-AF65-F5344CB8AC3E}">
-        <p14:creationId xmlns:p14="http://schemas.microsoft.com/office/powerpoint/2010/main" val="1048030353"/>
+        <p14:creationId xmlns:p14="http://schemas.microsoft.com/office/powerpoint/2010/main" val="494731359"/>
       </p:ext>
     </p:extLst>
   </p:cSld>
@@ -3235,7 +3244,7 @@
           <a:bodyPr/>
           <a:lstStyle/>
           <a:p>
-            <a:endParaRPr lang="en-US"/>
+            <a:endParaRPr lang="en-US" dirty="0"/>
           </a:p>
         </p:txBody>
       </p:sp>
@@ -3314,13 +3323,14 @@
           <a:p>
             <a:r>
               <a:rPr lang="en-US" dirty="0"/>
-              <a:t>Avoid the feeling of unresponsiveness when offline/</a:t>
-            </a:r>
-            <a:r>
-              <a:rPr lang="en-US"/>
-              <a:t>slow networks.</a:t>
-            </a:r>
-            <a:endParaRPr lang="en-US" dirty="0"/>
+              <a:t>Avoid the feeling of unresponsiveness when offline/slow networks.</a:t>
+            </a:r>
+          </a:p>
+          <a:p>
+            <a:r>
+              <a:rPr lang="en-US" dirty="0"/>
+              <a:t>Don’t Block The Queue!</a:t>
+            </a:r>
           </a:p>
         </p:txBody>
       </p:sp>
@@ -3376,25 +3386,6 @@
           </a:p>
         </p:txBody>
       </p:sp>
-      <p:sp>
-        <p:nvSpPr>
-          <p:cNvPr id="3" name="Content Placeholder 2"/>
-          <p:cNvSpPr>
-            <a:spLocks noGrp="1"/>
-          </p:cNvSpPr>
-          <p:nvPr>
-            <p:ph idx="1"/>
-          </p:nvPr>
-        </p:nvSpPr>
-        <p:spPr/>
-        <p:txBody>
-          <a:bodyPr/>
-          <a:lstStyle/>
-          <a:p>
-            <a:endParaRPr lang="en-US"/>
-          </a:p>
-        </p:txBody>
-      </p:sp>
     </p:spTree>
     <p:extLst>
       <p:ext uri="{BB962C8B-B14F-4D97-AF65-F5344CB8AC3E}">
@@ -3622,6 +3613,39 @@
           <a:p>
             <a:r>
               <a:rPr lang="en-US" dirty="0"/>
+              <a:t>=&gt; Create XHR Object </a:t>
+            </a:r>
+          </a:p>
+          <a:p>
+            <a:r>
+              <a:rPr lang="en-US" dirty="0"/>
+              <a:t>=&gt; Open a connection </a:t>
+            </a:r>
+          </a:p>
+          <a:p>
+            <a:r>
+              <a:rPr lang="en-US" dirty="0"/>
+              <a:t>=&gt; Set headers </a:t>
+            </a:r>
+          </a:p>
+          <a:p>
+            <a:r>
+              <a:rPr lang="en-US" dirty="0"/>
+              <a:t>=&gt; Set listeners </a:t>
+            </a:r>
+          </a:p>
+          <a:p>
+            <a:r>
+              <a:rPr lang="en-US" dirty="0"/>
+              <a:t>=&gt; send data</a:t>
+            </a:r>
+          </a:p>
+          <a:p>
+            <a:endParaRPr lang="en-US" dirty="0"/>
+          </a:p>
+          <a:p>
+            <a:r>
+              <a:rPr lang="en-US" dirty="0"/>
               <a:t>Demo 1</a:t>
             </a:r>
           </a:p>
@@ -3817,7 +3841,16 @@
           <a:bodyPr/>
           <a:lstStyle/>
           <a:p>
-            <a:endParaRPr lang="en-US" dirty="0"/>
+            <a:r>
+              <a:rPr lang="en-US" dirty="0"/>
+              <a:t>Can be blocked by too many requests</a:t>
+            </a:r>
+          </a:p>
+          <a:p>
+            <a:r>
+              <a:rPr lang="en-US" dirty="0"/>
+              <a:t>Requests have Priority</a:t>
+            </a:r>
           </a:p>
         </p:txBody>
       </p:sp>
@@ -3868,7 +3901,7 @@
           <a:p>
             <a:r>
               <a:rPr lang="en-US" dirty="0"/>
-              <a:t>Server Side Rendering-</a:t>
+              <a:t>Polling-</a:t>
             </a:r>
           </a:p>
         </p:txBody>
@@ -3890,63 +3923,27 @@
           <a:p>
             <a:r>
               <a:rPr lang="en-US" dirty="0"/>
-              <a:t>JavaScript disabled in browser.</a:t>
-            </a:r>
-          </a:p>
-          <a:p>
-            <a:r>
-              <a:rPr lang="en-US" dirty="0"/>
-              <a:t>Error in script.</a:t>
-            </a:r>
-          </a:p>
-          <a:p>
-            <a:r>
-              <a:rPr lang="en-US" dirty="0"/>
-              <a:t>JavaScript file not available due to-</a:t>
-            </a:r>
-          </a:p>
-          <a:p>
-            <a:pPr lvl="1"/>
-            <a:r>
-              <a:rPr lang="en-US" dirty="0"/>
-              <a:t>Mistake in Code.</a:t>
-            </a:r>
-          </a:p>
-          <a:p>
-            <a:pPr lvl="1"/>
-            <a:r>
-              <a:rPr lang="en-US" dirty="0"/>
-              <a:t>Failure of server or CDN.</a:t>
-            </a:r>
-          </a:p>
-          <a:p>
-            <a:pPr lvl="1"/>
-            <a:r>
-              <a:rPr lang="en-US" dirty="0"/>
-              <a:t>Network time-out.</a:t>
-            </a:r>
-          </a:p>
-          <a:p>
-            <a:pPr lvl="1"/>
-            <a:r>
-              <a:rPr lang="en-US" dirty="0"/>
-              <a:t>Blocked by proxy.</a:t>
-            </a:r>
-          </a:p>
-          <a:p>
-            <a:pPr lvl="1"/>
-            <a:r>
-              <a:rPr lang="en-US"/>
-              <a:t>Blocked by Browser.</a:t>
-            </a:r>
-            <a:endParaRPr lang="en-US" dirty="0"/>
+              <a:t>Short term polling</a:t>
+            </a:r>
+          </a:p>
+          <a:p>
+            <a:r>
+              <a:rPr lang="en-US" dirty="0"/>
+              <a:t>Long term polling</a:t>
+            </a:r>
+          </a:p>
+          <a:p>
+            <a:r>
+              <a:rPr lang="en-US" dirty="0"/>
+              <a:t>Short term waited polling</a:t>
+            </a:r>
           </a:p>
         </p:txBody>
       </p:sp>
     </p:spTree>
     <p:extLst>
       <p:ext uri="{BB962C8B-B14F-4D97-AF65-F5344CB8AC3E}">
-        <p14:creationId xmlns:p14="http://schemas.microsoft.com/office/powerpoint/2010/main" val="2469038449"/>
+        <p14:creationId xmlns:p14="http://schemas.microsoft.com/office/powerpoint/2010/main" val="789491170"/>
       </p:ext>
     </p:extLst>
   </p:cSld>
@@ -3990,7 +3987,7 @@
           <a:p>
             <a:r>
               <a:rPr lang="en-US" dirty="0"/>
-              <a:t>Single Page Applications</a:t>
+              <a:t>Server Side Rendering-</a:t>
             </a:r>
           </a:p>
         </p:txBody>
@@ -4012,19 +4009,55 @@
           <a:p>
             <a:r>
               <a:rPr lang="en-US" dirty="0"/>
-              <a:t>Problem Of Refresh</a:t>
-            </a:r>
-          </a:p>
-          <a:p>
-            <a:r>
-              <a:rPr lang="en-US" dirty="0"/>
-              <a:t>Routing</a:t>
-            </a:r>
-          </a:p>
-          <a:p>
-            <a:pPr marL="0" indent="0">
-              <a:buNone/>
-            </a:pPr>
+              <a:t>JavaScript disabled in browser.</a:t>
+            </a:r>
+          </a:p>
+          <a:p>
+            <a:r>
+              <a:rPr lang="en-US" dirty="0"/>
+              <a:t>Error in script.</a:t>
+            </a:r>
+          </a:p>
+          <a:p>
+            <a:r>
+              <a:rPr lang="en-US" dirty="0"/>
+              <a:t>JavaScript file not available due to-</a:t>
+            </a:r>
+          </a:p>
+          <a:p>
+            <a:pPr lvl="1"/>
+            <a:r>
+              <a:rPr lang="en-US" dirty="0"/>
+              <a:t>Mistake in Code.</a:t>
+            </a:r>
+          </a:p>
+          <a:p>
+            <a:pPr lvl="1"/>
+            <a:r>
+              <a:rPr lang="en-US" dirty="0"/>
+              <a:t>Failure of server or CDN.</a:t>
+            </a:r>
+          </a:p>
+          <a:p>
+            <a:pPr lvl="1"/>
+            <a:r>
+              <a:rPr lang="en-US" dirty="0"/>
+              <a:t>Network time-out.</a:t>
+            </a:r>
+          </a:p>
+          <a:p>
+            <a:pPr lvl="1"/>
+            <a:r>
+              <a:rPr lang="en-US" dirty="0"/>
+              <a:t>Blocked by proxy.</a:t>
+            </a:r>
+          </a:p>
+          <a:p>
+            <a:pPr lvl="1"/>
+            <a:r>
+              <a:rPr lang="en-US"/>
+              <a:t>Blocked by Browser.</a:t>
+            </a:r>
             <a:endParaRPr lang="en-US" dirty="0"/>
           </a:p>
         </p:txBody>
@@ -4032,7 +4065,7 @@
     </p:spTree>
     <p:extLst>
       <p:ext uri="{BB962C8B-B14F-4D97-AF65-F5344CB8AC3E}">
-        <p14:creationId xmlns:p14="http://schemas.microsoft.com/office/powerpoint/2010/main" val="4229231221"/>
+        <p14:creationId xmlns:p14="http://schemas.microsoft.com/office/powerpoint/2010/main" val="2469038449"/>
       </p:ext>
     </p:extLst>
   </p:cSld>
@@ -4076,7 +4109,7 @@
           <a:p>
             <a:r>
               <a:rPr lang="en-US" dirty="0"/>
-              <a:t>CORS-</a:t>
+              <a:t>Caching</a:t>
             </a:r>
           </a:p>
         </p:txBody>
@@ -4098,13 +4131,13 @@
           <a:p>
             <a:r>
               <a:rPr lang="en-US" dirty="0"/>
-              <a:t>Cross Origin Resource Sharing</a:t>
-            </a:r>
-          </a:p>
-          <a:p>
-            <a:r>
-              <a:rPr lang="en-US" dirty="0"/>
-              <a:t>Origin : protocol  Uri  port-no</a:t>
+              <a:t>Cache Headers</a:t>
+            </a:r>
+          </a:p>
+          <a:p>
+            <a:r>
+              <a:rPr lang="en-US" dirty="0"/>
+              <a:t>E Tags (Entity Tags)</a:t>
             </a:r>
           </a:p>
         </p:txBody>
@@ -4112,7 +4145,7 @@
     </p:spTree>
     <p:extLst>
       <p:ext uri="{BB962C8B-B14F-4D97-AF65-F5344CB8AC3E}">
-        <p14:creationId xmlns:p14="http://schemas.microsoft.com/office/powerpoint/2010/main" val="494731359"/>
+        <p14:creationId xmlns:p14="http://schemas.microsoft.com/office/powerpoint/2010/main" val="1048030353"/>
       </p:ext>
     </p:extLst>
   </p:cSld>

</xml_diff>

<commit_message>
fix server side rendering code.
</commit_message>
<xml_diff>
--- a/AJAX Advanced.pptx
+++ b/AJAX Advanced.pptx
@@ -254,7 +254,7 @@
           <a:p>
             <a:fld id="{A48A01B0-8BFD-4111-AE9E-AE1B83A443E2}" type="datetimeFigureOut">
               <a:rPr lang="en-US" smtClean="0"/>
-              <a:t>10-Apr-17</a:t>
+              <a:t>11-Apr-17</a:t>
             </a:fld>
             <a:endParaRPr lang="en-US"/>
           </a:p>
@@ -422,7 +422,7 @@
           <a:p>
             <a:fld id="{A48A01B0-8BFD-4111-AE9E-AE1B83A443E2}" type="datetimeFigureOut">
               <a:rPr lang="en-US" smtClean="0"/>
-              <a:t>10-Apr-17</a:t>
+              <a:t>11-Apr-17</a:t>
             </a:fld>
             <a:endParaRPr lang="en-US"/>
           </a:p>
@@ -600,7 +600,7 @@
           <a:p>
             <a:fld id="{A48A01B0-8BFD-4111-AE9E-AE1B83A443E2}" type="datetimeFigureOut">
               <a:rPr lang="en-US" smtClean="0"/>
-              <a:t>10-Apr-17</a:t>
+              <a:t>11-Apr-17</a:t>
             </a:fld>
             <a:endParaRPr lang="en-US"/>
           </a:p>
@@ -768,7 +768,7 @@
           <a:p>
             <a:fld id="{A48A01B0-8BFD-4111-AE9E-AE1B83A443E2}" type="datetimeFigureOut">
               <a:rPr lang="en-US" smtClean="0"/>
-              <a:t>10-Apr-17</a:t>
+              <a:t>11-Apr-17</a:t>
             </a:fld>
             <a:endParaRPr lang="en-US"/>
           </a:p>
@@ -1013,7 +1013,7 @@
           <a:p>
             <a:fld id="{A48A01B0-8BFD-4111-AE9E-AE1B83A443E2}" type="datetimeFigureOut">
               <a:rPr lang="en-US" smtClean="0"/>
-              <a:t>10-Apr-17</a:t>
+              <a:t>11-Apr-17</a:t>
             </a:fld>
             <a:endParaRPr lang="en-US"/>
           </a:p>
@@ -1242,7 +1242,7 @@
           <a:p>
             <a:fld id="{A48A01B0-8BFD-4111-AE9E-AE1B83A443E2}" type="datetimeFigureOut">
               <a:rPr lang="en-US" smtClean="0"/>
-              <a:t>10-Apr-17</a:t>
+              <a:t>11-Apr-17</a:t>
             </a:fld>
             <a:endParaRPr lang="en-US"/>
           </a:p>
@@ -1606,7 +1606,7 @@
           <a:p>
             <a:fld id="{A48A01B0-8BFD-4111-AE9E-AE1B83A443E2}" type="datetimeFigureOut">
               <a:rPr lang="en-US" smtClean="0"/>
-              <a:t>10-Apr-17</a:t>
+              <a:t>11-Apr-17</a:t>
             </a:fld>
             <a:endParaRPr lang="en-US"/>
           </a:p>
@@ -1723,7 +1723,7 @@
           <a:p>
             <a:fld id="{A48A01B0-8BFD-4111-AE9E-AE1B83A443E2}" type="datetimeFigureOut">
               <a:rPr lang="en-US" smtClean="0"/>
-              <a:t>10-Apr-17</a:t>
+              <a:t>11-Apr-17</a:t>
             </a:fld>
             <a:endParaRPr lang="en-US"/>
           </a:p>
@@ -1818,7 +1818,7 @@
           <a:p>
             <a:fld id="{A48A01B0-8BFD-4111-AE9E-AE1B83A443E2}" type="datetimeFigureOut">
               <a:rPr lang="en-US" smtClean="0"/>
-              <a:t>10-Apr-17</a:t>
+              <a:t>11-Apr-17</a:t>
             </a:fld>
             <a:endParaRPr lang="en-US"/>
           </a:p>
@@ -2093,7 +2093,7 @@
           <a:p>
             <a:fld id="{A48A01B0-8BFD-4111-AE9E-AE1B83A443E2}" type="datetimeFigureOut">
               <a:rPr lang="en-US" smtClean="0"/>
-              <a:t>10-Apr-17</a:t>
+              <a:t>11-Apr-17</a:t>
             </a:fld>
             <a:endParaRPr lang="en-US"/>
           </a:p>
@@ -2345,7 +2345,7 @@
           <a:p>
             <a:fld id="{A48A01B0-8BFD-4111-AE9E-AE1B83A443E2}" type="datetimeFigureOut">
               <a:rPr lang="en-US" smtClean="0"/>
-              <a:t>10-Apr-17</a:t>
+              <a:t>11-Apr-17</a:t>
             </a:fld>
             <a:endParaRPr lang="en-US"/>
           </a:p>
@@ -2556,7 +2556,7 @@
           <a:p>
             <a:fld id="{A48A01B0-8BFD-4111-AE9E-AE1B83A443E2}" type="datetimeFigureOut">
               <a:rPr lang="en-US" smtClean="0"/>
-              <a:t>10-Apr-17</a:t>
+              <a:t>11-Apr-17</a:t>
             </a:fld>
             <a:endParaRPr lang="en-US"/>
           </a:p>
@@ -4142,6 +4142,47 @@
           </a:p>
         </p:txBody>
       </p:sp>
+      <p:pic>
+        <p:nvPicPr>
+          <p:cNvPr id="1026" name="Picture 2" descr="HTTP Cache-Control example"/>
+          <p:cNvPicPr>
+            <a:picLocks noChangeAspect="1" noChangeArrowheads="1"/>
+          </p:cNvPicPr>
+          <p:nvPr/>
+        </p:nvPicPr>
+        <p:blipFill>
+          <a:blip r:embed="rId2">
+            <a:extLst>
+              <a:ext uri="{28A0092B-C50C-407E-A947-70E740481C1C}">
+                <a14:useLocalDpi xmlns:a14="http://schemas.microsoft.com/office/drawing/2010/main" val="0"/>
+              </a:ext>
+            </a:extLst>
+          </a:blip>
+          <a:srcRect/>
+          <a:stretch>
+            <a:fillRect/>
+          </a:stretch>
+        </p:blipFill>
+        <p:spPr bwMode="auto">
+          <a:xfrm>
+            <a:off x="2361511" y="1825625"/>
+            <a:ext cx="8867636" cy="4022240"/>
+          </a:xfrm>
+          <a:prstGeom prst="rect">
+            <a:avLst/>
+          </a:prstGeom>
+          <a:noFill/>
+          <a:extLst>
+            <a:ext uri="{909E8E84-426E-40DD-AFC4-6F175D3DCCD1}">
+              <a14:hiddenFill xmlns:a14="http://schemas.microsoft.com/office/drawing/2010/main">
+                <a:solidFill>
+                  <a:srgbClr val="FFFFFF"/>
+                </a:solidFill>
+              </a14:hiddenFill>
+            </a:ext>
+          </a:extLst>
+        </p:spPr>
+      </p:pic>
     </p:spTree>
     <p:extLst>
       <p:ext uri="{BB962C8B-B14F-4D97-AF65-F5344CB8AC3E}">

</xml_diff>